<commit_message>
minor changes in the final presentation (forgot to commit them earlier).
</commit_message>
<xml_diff>
--- a/ExtraBees/doc/AdvancedRenderingFinal.pptx
+++ b/ExtraBees/doc/AdvancedRenderingFinal.pptx
@@ -4850,7 +4850,7 @@
                                 </p:cTn>
                               </p:par>
                               <p:par>
-                                <p:cTn id="29" presetID="1" presetClass="entr" presetSubtype="0" fill="hold" nodeType="withEffect">
+                                <p:cTn id="29" presetID="1" presetClass="entr" presetSubtype="0" fill="hold" grpId="0" nodeType="withEffect">
                                   <p:stCondLst>
                                     <p:cond delay="0"/>
                                   </p:stCondLst>
@@ -4863,11 +4863,7 @@
                                           </p:stCondLst>
                                         </p:cTn>
                                         <p:tgtEl>
-                                          <p:spTgt spid="37">
-                                            <p:txEl>
-                                              <p:pRg st="1" end="1"/>
-                                            </p:txEl>
-                                          </p:spTgt>
+                                          <p:spTgt spid="35"/>
                                         </p:tgtEl>
                                         <p:attrNameLst>
                                           <p:attrName>style.visibility</p:attrName>
@@ -4894,6 +4890,37 @@
                                           </p:stCondLst>
                                         </p:cTn>
                                         <p:tgtEl>
+                                          <p:spTgt spid="37">
+                                            <p:txEl>
+                                              <p:pRg st="1" end="1"/>
+                                            </p:txEl>
+                                          </p:spTgt>
+                                        </p:tgtEl>
+                                        <p:attrNameLst>
+                                          <p:attrName>style.visibility</p:attrName>
+                                        </p:attrNameLst>
+                                      </p:cBhvr>
+                                      <p:to>
+                                        <p:strVal val="visible"/>
+                                      </p:to>
+                                    </p:set>
+                                  </p:childTnLst>
+                                </p:cTn>
+                              </p:par>
+                              <p:par>
+                                <p:cTn id="33" presetID="1" presetClass="entr" presetSubtype="0" fill="hold" nodeType="withEffect">
+                                  <p:stCondLst>
+                                    <p:cond delay="0"/>
+                                  </p:stCondLst>
+                                  <p:childTnLst>
+                                    <p:set>
+                                      <p:cBhvr>
+                                        <p:cTn id="34" dur="1" fill="hold">
+                                          <p:stCondLst>
+                                            <p:cond delay="0"/>
+                                          </p:stCondLst>
+                                        </p:cTn>
+                                        <p:tgtEl>
                                           <p:spTgt spid="32"/>
                                         </p:tgtEl>
                                         <p:attrNameLst>
@@ -4914,50 +4941,19 @@
                     </p:cTn>
                   </p:par>
                   <p:par>
-                    <p:cTn id="33" fill="hold">
+                    <p:cTn id="35" fill="hold">
                       <p:stCondLst>
                         <p:cond delay="indefinite"/>
                       </p:stCondLst>
                       <p:childTnLst>
                         <p:par>
-                          <p:cTn id="34" fill="hold">
+                          <p:cTn id="36" fill="hold">
                             <p:stCondLst>
                               <p:cond delay="0"/>
                             </p:stCondLst>
                             <p:childTnLst>
                               <p:par>
-                                <p:cTn id="35" presetID="1" presetClass="entr" presetSubtype="0" fill="hold" nodeType="clickEffect">
-                                  <p:stCondLst>
-                                    <p:cond delay="0"/>
-                                  </p:stCondLst>
-                                  <p:childTnLst>
-                                    <p:set>
-                                      <p:cBhvr>
-                                        <p:cTn id="36" dur="1" fill="hold">
-                                          <p:stCondLst>
-                                            <p:cond delay="0"/>
-                                          </p:stCondLst>
-                                        </p:cTn>
-                                        <p:tgtEl>
-                                          <p:spTgt spid="37">
-                                            <p:txEl>
-                                              <p:pRg st="2" end="2"/>
-                                            </p:txEl>
-                                          </p:spTgt>
-                                        </p:tgtEl>
-                                        <p:attrNameLst>
-                                          <p:attrName>style.visibility</p:attrName>
-                                        </p:attrNameLst>
-                                      </p:cBhvr>
-                                      <p:to>
-                                        <p:strVal val="visible"/>
-                                      </p:to>
-                                    </p:set>
-                                  </p:childTnLst>
-                                </p:cTn>
-                              </p:par>
-                              <p:par>
-                                <p:cTn id="37" presetID="1" presetClass="entr" presetSubtype="0" fill="hold" nodeType="withEffect">
+                                <p:cTn id="37" presetID="1" presetClass="entr" presetSubtype="0" fill="hold" nodeType="clickEffect">
                                   <p:stCondLst>
                                     <p:cond delay="0"/>
                                   </p:stCondLst>
@@ -4972,7 +4968,7 @@
                                         <p:tgtEl>
                                           <p:spTgt spid="37">
                                             <p:txEl>
-                                              <p:pRg st="3" end="3"/>
+                                              <p:pRg st="2" end="2"/>
                                             </p:txEl>
                                           </p:spTgt>
                                         </p:tgtEl>
@@ -5003,6 +4999,37 @@
                                         <p:tgtEl>
                                           <p:spTgt spid="37">
                                             <p:txEl>
+                                              <p:pRg st="3" end="3"/>
+                                            </p:txEl>
+                                          </p:spTgt>
+                                        </p:tgtEl>
+                                        <p:attrNameLst>
+                                          <p:attrName>style.visibility</p:attrName>
+                                        </p:attrNameLst>
+                                      </p:cBhvr>
+                                      <p:to>
+                                        <p:strVal val="visible"/>
+                                      </p:to>
+                                    </p:set>
+                                  </p:childTnLst>
+                                </p:cTn>
+                              </p:par>
+                              <p:par>
+                                <p:cTn id="41" presetID="1" presetClass="entr" presetSubtype="0" fill="hold" nodeType="withEffect">
+                                  <p:stCondLst>
+                                    <p:cond delay="0"/>
+                                  </p:stCondLst>
+                                  <p:childTnLst>
+                                    <p:set>
+                                      <p:cBhvr>
+                                        <p:cTn id="42" dur="1" fill="hold">
+                                          <p:stCondLst>
+                                            <p:cond delay="0"/>
+                                          </p:stCondLst>
+                                        </p:cTn>
+                                        <p:tgtEl>
+                                          <p:spTgt spid="37">
+                                            <p:txEl>
                                               <p:pRg st="4" end="4"/>
                                             </p:txEl>
                                           </p:spTgt>
@@ -5025,26 +5052,26 @@
                     </p:cTn>
                   </p:par>
                   <p:par>
-                    <p:cTn id="41" fill="hold">
+                    <p:cTn id="43" fill="hold">
                       <p:stCondLst>
                         <p:cond delay="indefinite"/>
                       </p:stCondLst>
                       <p:childTnLst>
                         <p:par>
-                          <p:cTn id="42" fill="hold">
+                          <p:cTn id="44" fill="hold">
                             <p:stCondLst>
                               <p:cond delay="0"/>
                             </p:stCondLst>
                             <p:childTnLst>
                               <p:par>
-                                <p:cTn id="43" presetID="1" presetClass="entr" presetSubtype="0" fill="hold" nodeType="clickEffect">
+                                <p:cTn id="45" presetID="1" presetClass="entr" presetSubtype="0" fill="hold" nodeType="clickEffect">
                                   <p:stCondLst>
                                     <p:cond delay="0"/>
                                   </p:stCondLst>
                                   <p:childTnLst>
                                     <p:set>
                                       <p:cBhvr>
-                                        <p:cTn id="44" dur="1" fill="hold">
+                                        <p:cTn id="46" dur="1" fill="hold">
                                           <p:stCondLst>
                                             <p:cond delay="0"/>
                                           </p:stCondLst>
@@ -5068,14 +5095,14 @@
                                 </p:cTn>
                               </p:par>
                               <p:par>
-                                <p:cTn id="45" presetID="1" presetClass="entr" presetSubtype="0" fill="hold" nodeType="withEffect">
+                                <p:cTn id="47" presetID="1" presetClass="entr" presetSubtype="0" fill="hold" nodeType="withEffect">
                                   <p:stCondLst>
                                     <p:cond delay="0"/>
                                   </p:stCondLst>
                                   <p:childTnLst>
                                     <p:set>
                                       <p:cBhvr>
-                                        <p:cTn id="46" dur="1" fill="hold">
+                                        <p:cTn id="48" dur="1" fill="hold">
                                           <p:stCondLst>
                                             <p:cond delay="0"/>
                                           </p:stCondLst>
@@ -5125,6 +5152,9 @@
         </p:cTn>
       </p:par>
     </p:tnLst>
+    <p:bldLst>
+      <p:bldP spid="35" grpId="0"/>
+    </p:bldLst>
   </p:timing>
 </p:sld>
 </file>

</xml_diff>